<commit_message>
Atualização de documentacao de engenharia
</commit_message>
<xml_diff>
--- a/2SEM/Engenharia_De_Software/Atividade_Requisitos_SACAD.pptx
+++ b/2SEM/Engenharia_De_Software/Atividade_Requisitos_SACAD.pptx
@@ -270,6 +270,11 @@
       </a:defRPr>
     </a:lvl9pPr>
   </p:defaultTextStyle>
+  <p:extLst>
+    <p:ext uri="{EFAFB233-063F-42B5-8137-9DF3F51BA10A}">
+      <p15:sldGuideLst xmlns:p15="http://schemas.microsoft.com/office/powerpoint/2012/main"/>
+    </p:ext>
+  </p:extLst>
 </p:presentation>
 </file>
 
@@ -39058,30 +39063,32 @@
       </p:grpSpPr>
       <p:pic>
         <p:nvPicPr>
-          <p:cNvPr id="239" name="Google Shape;239;p37"/>
-          <p:cNvPicPr preferRelativeResize="0"/>
+          <p:cNvPr id="3" name="Imagem 2">
+            <a:extLst>
+              <a:ext uri="{FF2B5EF4-FFF2-40B4-BE49-F238E27FC236}">
+                <a16:creationId xmlns:a16="http://schemas.microsoft.com/office/drawing/2014/main" id="{FCBE9008-14B0-4C9F-9D81-A073BD2E7C45}"/>
+              </a:ext>
+            </a:extLst>
+          </p:cNvPr>
+          <p:cNvPicPr>
+            <a:picLocks noChangeAspect="1"/>
+          </p:cNvPicPr>
           <p:nvPr/>
         </p:nvPicPr>
         <p:blipFill>
-          <a:blip r:embed="rId3">
-            <a:alphaModFix/>
-          </a:blip>
+          <a:blip r:embed="rId3"/>
           <a:stretch>
             <a:fillRect/>
           </a:stretch>
         </p:blipFill>
         <p:spPr>
           <a:xfrm>
-            <a:off x="152400" y="685800"/>
-            <a:ext cx="11930401" cy="4924525"/>
+            <a:off x="51515" y="1331486"/>
+            <a:ext cx="12022287" cy="3794305"/>
           </a:xfrm>
           <a:prstGeom prst="rect">
             <a:avLst/>
           </a:prstGeom>
-          <a:noFill/>
-          <a:ln>
-            <a:noFill/>
-          </a:ln>
         </p:spPr>
       </p:pic>
     </p:spTree>

</xml_diff>